<commit_message>
20-21 School Update #2
</commit_message>
<xml_diff>
--- a/High School/Modern Electricity and Electronics/Unit 1 - Introduction, Safety & Design Process/Section 1 - Syllabus Overview and Classroom Operation/Assets/Unit 1 - Section 1 - Syllabus.pptx
+++ b/High School/Modern Electricity and Electronics/Unit 1 - Introduction, Safety & Design Process/Section 1 - Syllabus Overview and Classroom Operation/Assets/Unit 1 - Section 1 - Syllabus.pptx
@@ -5,17 +5,16 @@
     <p:sldMasterId id="2147483648" r:id="rId1"/>
   </p:sldMasterIdLst>
   <p:notesMasterIdLst>
-    <p:notesMasterId r:id="rId7"/>
+    <p:notesMasterId r:id="rId6"/>
   </p:notesMasterIdLst>
   <p:handoutMasterIdLst>
-    <p:handoutMasterId r:id="rId8"/>
+    <p:handoutMasterId r:id="rId7"/>
   </p:handoutMasterIdLst>
   <p:sldIdLst>
     <p:sldId id="268" r:id="rId2"/>
     <p:sldId id="269" r:id="rId3"/>
     <p:sldId id="271" r:id="rId4"/>
     <p:sldId id="270" r:id="rId5"/>
-    <p:sldId id="272" r:id="rId6"/>
   </p:sldIdLst>
   <p:sldSz cx="12192000" cy="6858000"/>
   <p:notesSz cx="6858000" cy="9144000"/>
@@ -218,7 +217,7 @@
           <a:p>
             <a:fld id="{6AC4FB8F-ED15-48AB-97BD-17129D4E699D}" type="datetimeFigureOut">
               <a:rPr lang="en-US" smtClean="0"/>
-              <a:t>8/31/2020</a:t>
+              <a:t>9/8/2020</a:t>
             </a:fld>
             <a:endParaRPr lang="en-US" dirty="0"/>
           </a:p>
@@ -383,7 +382,7 @@
           <a:p>
             <a:fld id="{BBC9D437-CD83-4825-AD0D-5E7B341BC79B}" type="datetimeFigureOut">
               <a:rPr lang="en-US" smtClean="0"/>
-              <a:t>8/31/2020</a:t>
+              <a:t>9/8/2020</a:t>
             </a:fld>
             <a:endParaRPr lang="en-US" dirty="0"/>
           </a:p>
@@ -809,7 +808,7 @@
           <a:p>
             <a:fld id="{85AB7CBB-843F-464A-A764-71D6ADC27CFA}" type="datetime1">
               <a:rPr lang="en-US" smtClean="0"/>
-              <a:t>8/31/2020</a:t>
+              <a:t>9/8/2020</a:t>
             </a:fld>
             <a:endParaRPr lang="en-US" dirty="0"/>
           </a:p>
@@ -994,7 +993,7 @@
           <a:p>
             <a:fld id="{CBEFC03D-3A1F-4813-9337-02411FCC3A9A}" type="datetime1">
               <a:rPr lang="en-US" smtClean="0"/>
-              <a:t>8/31/2020</a:t>
+              <a:t>9/8/2020</a:t>
             </a:fld>
             <a:endParaRPr lang="en-US" dirty="0"/>
           </a:p>
@@ -1192,7 +1191,7 @@
           <a:p>
             <a:fld id="{3D638F79-DFA0-4C26-9553-23A017B69AB6}" type="datetime1">
               <a:rPr lang="en-US" smtClean="0"/>
-              <a:t>8/31/2020</a:t>
+              <a:t>9/8/2020</a:t>
             </a:fld>
             <a:endParaRPr lang="en-US" dirty="0"/>
           </a:p>
@@ -1386,7 +1385,7 @@
           <a:p>
             <a:fld id="{A70B34E7-E1D9-4FBF-A1A0-4009669A00BF}" type="datetime1">
               <a:rPr lang="en-US" smtClean="0"/>
-              <a:t>8/31/2020</a:t>
+              <a:t>9/8/2020</a:t>
             </a:fld>
             <a:endParaRPr lang="en-US" dirty="0"/>
           </a:p>
@@ -1875,7 +1874,7 @@
           <a:p>
             <a:fld id="{7579E8B6-2F47-420B-83EA-EB2285D13EC9}" type="datetime1">
               <a:rPr lang="en-US" smtClean="0"/>
-              <a:t>8/31/2020</a:t>
+              <a:t>9/8/2020</a:t>
             </a:fld>
             <a:endParaRPr lang="en-US" dirty="0"/>
           </a:p>
@@ -2313,7 +2312,7 @@
           <a:p>
             <a:fld id="{2304803D-B10E-4B90-8456-A0E05393E233}" type="datetime1">
               <a:rPr lang="en-US" smtClean="0"/>
-              <a:t>8/31/2020</a:t>
+              <a:t>9/8/2020</a:t>
             </a:fld>
             <a:endParaRPr lang="en-US" dirty="0"/>
           </a:p>
@@ -2446,7 +2445,7 @@
           <a:p>
             <a:fld id="{CCE1E62F-6CCE-4064-96C2-2084AF883904}" type="datetime1">
               <a:rPr lang="en-US" smtClean="0"/>
-              <a:t>8/31/2020</a:t>
+              <a:t>9/8/2020</a:t>
             </a:fld>
             <a:endParaRPr lang="en-US" dirty="0"/>
           </a:p>
@@ -2556,7 +2555,7 @@
           <a:p>
             <a:fld id="{AA615CA6-EC4D-4728-8AA6-534BE7E9B67C}" type="datetime1">
               <a:rPr lang="en-US" smtClean="0"/>
-              <a:t>8/31/2020</a:t>
+              <a:t>9/8/2020</a:t>
             </a:fld>
             <a:endParaRPr lang="en-US" dirty="0"/>
           </a:p>
@@ -2870,7 +2869,7 @@
           <a:p>
             <a:fld id="{A6139942-0A2E-443A-842F-D6DE74360370}" type="datetime1">
               <a:rPr lang="en-US" smtClean="0"/>
-              <a:t>8/31/2020</a:t>
+              <a:t>9/8/2020</a:t>
             </a:fld>
             <a:endParaRPr lang="en-US" dirty="0"/>
           </a:p>
@@ -3387,7 +3386,7 @@
           <a:p>
             <a:fld id="{3F138946-C5C1-4A11-BA69-F12F43F8A94B}" type="datetime1">
               <a:rPr lang="en-US" smtClean="0"/>
-              <a:t>8/31/2020</a:t>
+              <a:t>9/8/2020</a:t>
             </a:fld>
             <a:endParaRPr lang="en-US" dirty="0"/>
           </a:p>
@@ -4440,128 +4439,6 @@
     <p:extLst>
       <p:ext uri="{BB962C8B-B14F-4D97-AF65-F5344CB8AC3E}">
         <p14:creationId xmlns:p14="http://schemas.microsoft.com/office/powerpoint/2010/main" val="3332330429"/>
-      </p:ext>
-    </p:extLst>
-  </p:cSld>
-  <p:clrMapOvr>
-    <a:masterClrMapping/>
-  </p:clrMapOvr>
-  <mc:AlternateContent xmlns:mc="http://schemas.openxmlformats.org/markup-compatibility/2006" xmlns:p14="http://schemas.microsoft.com/office/powerpoint/2010/main">
-    <mc:Choice Requires="p14">
-      <p:transition spd="med" p14:dur="700">
-        <p:fade/>
-      </p:transition>
-    </mc:Choice>
-    <mc:Fallback xmlns="">
-      <p:transition spd="med">
-        <p:fade/>
-      </p:transition>
-    </mc:Fallback>
-  </mc:AlternateContent>
-</p:sld>
-</file>
-
-<file path=ppt/slides/slide5.xml><?xml version="1.0" encoding="utf-8"?>
-<p:sld xmlns:a="http://schemas.openxmlformats.org/drawingml/2006/main" xmlns:r="http://schemas.openxmlformats.org/officeDocument/2006/relationships" xmlns:p="http://schemas.openxmlformats.org/presentationml/2006/main">
-  <p:cSld>
-    <p:spTree>
-      <p:nvGrpSpPr>
-        <p:cNvPr id="1" name=""/>
-        <p:cNvGrpSpPr/>
-        <p:nvPr/>
-      </p:nvGrpSpPr>
-      <p:grpSpPr>
-        <a:xfrm>
-          <a:off x="0" y="0"/>
-          <a:ext cx="0" cy="0"/>
-          <a:chOff x="0" y="0"/>
-          <a:chExt cx="0" cy="0"/>
-        </a:xfrm>
-      </p:grpSpPr>
-      <p:sp>
-        <p:nvSpPr>
-          <p:cNvPr id="2" name="Title 1"/>
-          <p:cNvSpPr>
-            <a:spLocks noGrp="1"/>
-          </p:cNvSpPr>
-          <p:nvPr>
-            <p:ph type="title"/>
-          </p:nvPr>
-        </p:nvSpPr>
-        <p:spPr/>
-        <p:txBody>
-          <a:bodyPr/>
-          <a:lstStyle/>
-          <a:p>
-            <a:r>
-              <a:rPr lang="en-US" dirty="0"/>
-              <a:t>Google classroom code</a:t>
-            </a:r>
-          </a:p>
-        </p:txBody>
-      </p:sp>
-      <p:sp>
-        <p:nvSpPr>
-          <p:cNvPr id="3" name="Content Placeholder 2"/>
-          <p:cNvSpPr>
-            <a:spLocks noGrp="1"/>
-          </p:cNvSpPr>
-          <p:nvPr>
-            <p:ph idx="1"/>
-          </p:nvPr>
-        </p:nvSpPr>
-        <p:spPr/>
-        <p:txBody>
-          <a:bodyPr>
-            <a:normAutofit/>
-          </a:bodyPr>
-          <a:lstStyle/>
-          <a:p>
-            <a:pPr marL="0" indent="0" algn="ctr">
-              <a:buNone/>
-            </a:pPr>
-            <a:r>
-              <a:rPr lang="en-US" sz="16900" b="1"/>
-              <a:t>okia9n</a:t>
-            </a:r>
-            <a:endParaRPr lang="en-US" sz="16900" b="1" dirty="0">
-              <a:cs typeface="Arial" pitchFamily="34" charset="0"/>
-            </a:endParaRPr>
-          </a:p>
-        </p:txBody>
-      </p:sp>
-      <p:sp>
-        <p:nvSpPr>
-          <p:cNvPr id="4" name="Footer Placeholder 3">
-            <a:extLst>
-              <a:ext uri="{FF2B5EF4-FFF2-40B4-BE49-F238E27FC236}">
-                <a16:creationId xmlns:a16="http://schemas.microsoft.com/office/drawing/2014/main" id="{EADFB87E-2A3F-4815-8F5E-3CF3521EBF24}"/>
-              </a:ext>
-            </a:extLst>
-          </p:cNvPr>
-          <p:cNvSpPr>
-            <a:spLocks noGrp="1"/>
-          </p:cNvSpPr>
-          <p:nvPr>
-            <p:ph type="ftr" sz="quarter" idx="11"/>
-          </p:nvPr>
-        </p:nvSpPr>
-        <p:spPr/>
-        <p:txBody>
-          <a:bodyPr/>
-          <a:lstStyle/>
-          <a:p>
-            <a:r>
-              <a:rPr lang="en-US" dirty="0"/>
-              <a:t>Unit 1 – Section 1 - Day 1</a:t>
-            </a:r>
-          </a:p>
-        </p:txBody>
-      </p:sp>
-    </p:spTree>
-    <p:extLst>
-      <p:ext uri="{BB962C8B-B14F-4D97-AF65-F5344CB8AC3E}">
-        <p14:creationId xmlns:p14="http://schemas.microsoft.com/office/powerpoint/2010/main" val="1645033752"/>
       </p:ext>
     </p:extLst>
   </p:cSld>

</xml_diff>